<commit_message>
Adding material for initial presentation
</commit_message>
<xml_diff>
--- a/initialPresentation/InitialPresentationSlides.pptx
+++ b/initialPresentation/InitialPresentationSlides.pptx
@@ -2,20 +2,20 @@
 <file path=ppt/presentation.xml><?xml version="1.0" encoding="utf-8"?>
 <p:presentation xmlns:a="http://schemas.openxmlformats.org/drawingml/2006/main" xmlns:r="http://schemas.openxmlformats.org/officeDocument/2006/relationships" xmlns:p="http://schemas.openxmlformats.org/presentationml/2006/main" saveSubsetFonts="1">
   <p:sldMasterIdLst>
-    <p:sldMasterId id="2147483648" r:id="rId2"/>
+    <p:sldMasterId id="2147483648" r:id="rId5"/>
   </p:sldMasterIdLst>
   <p:notesMasterIdLst>
-    <p:notesMasterId r:id="rId11"/>
+    <p:notesMasterId r:id="rId14"/>
   </p:notesMasterIdLst>
   <p:sldIdLst>
-    <p:sldId id="288" r:id="rId3"/>
-    <p:sldId id="258" r:id="rId4"/>
-    <p:sldId id="351" r:id="rId5"/>
-    <p:sldId id="352" r:id="rId6"/>
-    <p:sldId id="353" r:id="rId7"/>
-    <p:sldId id="354" r:id="rId8"/>
-    <p:sldId id="355" r:id="rId9"/>
-    <p:sldId id="260" r:id="rId10"/>
+    <p:sldId id="288" r:id="rId6"/>
+    <p:sldId id="258" r:id="rId7"/>
+    <p:sldId id="351" r:id="rId8"/>
+    <p:sldId id="352" r:id="rId9"/>
+    <p:sldId id="353" r:id="rId10"/>
+    <p:sldId id="354" r:id="rId11"/>
+    <p:sldId id="355" r:id="rId12"/>
+    <p:sldId id="260" r:id="rId13"/>
   </p:sldIdLst>
   <p:sldSz cx="12192000" cy="6858000"/>
   <p:notesSz cx="6858000" cy="9144000"/>
@@ -141,8 +141,94 @@
 <p1510:revInfo xmlns:a="http://schemas.openxmlformats.org/drawingml/2006/main" xmlns:r="http://schemas.openxmlformats.org/officeDocument/2006/relationships" xmlns:p1510="http://schemas.microsoft.com/office/powerpoint/2015/10/main">
   <p1510:revLst>
     <p1510:client id="{89D3307F-7809-4AD3-B187-F9536DB91249}" v="95" dt="2018-11-26T02:30:18.909"/>
+    <p1510:client id="{C1D15BD1-E30A-4FB5-276F-F2F18BF81B27}" v="238" dt="2023-01-29T18:19:29.759"/>
+    <p1510:client id="{F9426310-88A9-4E15-9712-633ED0464A99}" v="86" dt="2023-01-30T20:36:59.166"/>
   </p1510:revLst>
 </p1510:revInfo>
+</file>
+
+<file path=ppt/changesInfos/changesInfo1.xml><?xml version="1.0" encoding="utf-8"?>
+<pc:chgInfo xmlns:a="http://schemas.openxmlformats.org/drawingml/2006/main" xmlns:r="http://schemas.openxmlformats.org/officeDocument/2006/relationships" xmlns:ac="http://schemas.microsoft.com/office/drawing/2013/main/command" xmlns:pc="http://schemas.microsoft.com/office/powerpoint/2013/main/command">
+  <pc:docChgLst>
+    <pc:chgData name="Smith, Charles03" userId="S::charsmith1@augusta.edu::5ffdd1b6-7e44-487a-bd5c-dd39fbb0392a" providerId="AD" clId="Web-{F9426310-88A9-4E15-9712-633ED0464A99}"/>
+    <pc:docChg chg="modSld">
+      <pc:chgData name="Smith, Charles03" userId="S::charsmith1@augusta.edu::5ffdd1b6-7e44-487a-bd5c-dd39fbb0392a" providerId="AD" clId="Web-{F9426310-88A9-4E15-9712-633ED0464A99}" dt="2023-01-30T20:36:58.494" v="58" actId="20577"/>
+      <pc:docMkLst>
+        <pc:docMk/>
+      </pc:docMkLst>
+      <pc:sldChg chg="addSp delSp modSp">
+        <pc:chgData name="Smith, Charles03" userId="S::charsmith1@augusta.edu::5ffdd1b6-7e44-487a-bd5c-dd39fbb0392a" providerId="AD" clId="Web-{F9426310-88A9-4E15-9712-633ED0464A99}" dt="2023-01-30T20:36:31.259" v="40" actId="20577"/>
+        <pc:sldMkLst>
+          <pc:docMk/>
+          <pc:sldMk cId="683920328" sldId="354"/>
+        </pc:sldMkLst>
+        <pc:spChg chg="add mod">
+          <ac:chgData name="Smith, Charles03" userId="S::charsmith1@augusta.edu::5ffdd1b6-7e44-487a-bd5c-dd39fbb0392a" providerId="AD" clId="Web-{F9426310-88A9-4E15-9712-633ED0464A99}" dt="2023-01-30T20:36:31.259" v="40" actId="20577"/>
+          <ac:spMkLst>
+            <pc:docMk/>
+            <pc:sldMk cId="683920328" sldId="354"/>
+            <ac:spMk id="6" creationId="{C54B83EF-4149-F4DD-E507-DBCEA91436A4}"/>
+          </ac:spMkLst>
+        </pc:spChg>
+        <pc:picChg chg="add del mod">
+          <ac:chgData name="Smith, Charles03" userId="S::charsmith1@augusta.edu::5ffdd1b6-7e44-487a-bd5c-dd39fbb0392a" providerId="AD" clId="Web-{F9426310-88A9-4E15-9712-633ED0464A99}" dt="2023-01-30T20:35:04.756" v="15"/>
+          <ac:picMkLst>
+            <pc:docMk/>
+            <pc:sldMk cId="683920328" sldId="354"/>
+            <ac:picMk id="3" creationId="{3F500EF5-4FC4-1197-9A1B-38535D9C5D75}"/>
+          </ac:picMkLst>
+        </pc:picChg>
+        <pc:picChg chg="add mod">
+          <ac:chgData name="Smith, Charles03" userId="S::charsmith1@augusta.edu::5ffdd1b6-7e44-487a-bd5c-dd39fbb0392a" providerId="AD" clId="Web-{F9426310-88A9-4E15-9712-633ED0464A99}" dt="2023-01-30T20:35:23.163" v="21" actId="1076"/>
+          <ac:picMkLst>
+            <pc:docMk/>
+            <pc:sldMk cId="683920328" sldId="354"/>
+            <ac:picMk id="5" creationId="{025FCAA5-B60D-1EEF-B674-26CDFB1793FD}"/>
+          </ac:picMkLst>
+        </pc:picChg>
+      </pc:sldChg>
+      <pc:sldChg chg="addSp delSp modSp">
+        <pc:chgData name="Smith, Charles03" userId="S::charsmith1@augusta.edu::5ffdd1b6-7e44-487a-bd5c-dd39fbb0392a" providerId="AD" clId="Web-{F9426310-88A9-4E15-9712-633ED0464A99}" dt="2023-01-30T20:36:58.494" v="58" actId="20577"/>
+        <pc:sldMkLst>
+          <pc:docMk/>
+          <pc:sldMk cId="3399955977" sldId="355"/>
+        </pc:sldMkLst>
+        <pc:spChg chg="add mod">
+          <ac:chgData name="Smith, Charles03" userId="S::charsmith1@augusta.edu::5ffdd1b6-7e44-487a-bd5c-dd39fbb0392a" providerId="AD" clId="Web-{F9426310-88A9-4E15-9712-633ED0464A99}" dt="2023-01-30T20:36:58.494" v="58" actId="20577"/>
+          <ac:spMkLst>
+            <pc:docMk/>
+            <pc:sldMk cId="3399955977" sldId="355"/>
+            <ac:spMk id="7" creationId="{27D93380-6521-92A3-2CFE-DE8812C417DA}"/>
+          </ac:spMkLst>
+        </pc:spChg>
+        <pc:picChg chg="add del mod">
+          <ac:chgData name="Smith, Charles03" userId="S::charsmith1@augusta.edu::5ffdd1b6-7e44-487a-bd5c-dd39fbb0392a" providerId="AD" clId="Web-{F9426310-88A9-4E15-9712-633ED0464A99}" dt="2023-01-30T20:32:35.283" v="10"/>
+          <ac:picMkLst>
+            <pc:docMk/>
+            <pc:sldMk cId="3399955977" sldId="355"/>
+            <ac:picMk id="3" creationId="{D4521179-7151-46C4-EC9B-69F6D02382A7}"/>
+          </ac:picMkLst>
+        </pc:picChg>
+        <pc:picChg chg="add del mod">
+          <ac:chgData name="Smith, Charles03" userId="S::charsmith1@augusta.edu::5ffdd1b6-7e44-487a-bd5c-dd39fbb0392a" providerId="AD" clId="Web-{F9426310-88A9-4E15-9712-633ED0464A99}" dt="2023-01-30T20:35:06.459" v="16"/>
+          <ac:picMkLst>
+            <pc:docMk/>
+            <pc:sldMk cId="3399955977" sldId="355"/>
+            <ac:picMk id="5" creationId="{D8352FE1-47A7-0FAE-F316-1E98C3979353}"/>
+          </ac:picMkLst>
+        </pc:picChg>
+        <pc:picChg chg="add mod">
+          <ac:chgData name="Smith, Charles03" userId="S::charsmith1@augusta.edu::5ffdd1b6-7e44-487a-bd5c-dd39fbb0392a" providerId="AD" clId="Web-{F9426310-88A9-4E15-9712-633ED0464A99}" dt="2023-01-30T20:35:39.210" v="25" actId="14100"/>
+          <ac:picMkLst>
+            <pc:docMk/>
+            <pc:sldMk cId="3399955977" sldId="355"/>
+            <ac:picMk id="6" creationId="{FF8B6B01-0B04-18A7-F078-4566EA9A5504}"/>
+          </ac:picMkLst>
+        </pc:picChg>
+      </pc:sldChg>
+    </pc:docChg>
+  </pc:docChgLst>
+</pc:chgInfo>
 </file>
 
 <file path=ppt/notesMasters/notesMaster1.xml><?xml version="1.0" encoding="utf-8"?>
@@ -227,7 +313,7 @@
           <a:p>
             <a:fld id="{AEED332E-DAC8-4A48-871C-0625C01F3ABB}" type="datetimeFigureOut">
               <a:rPr lang="en-US" smtClean="0"/>
-              <a:t>1/24/2023</a:t>
+              <a:t>1/31/2023</a:t>
             </a:fld>
             <a:endParaRPr lang="en-US"/>
           </a:p>
@@ -809,7 +895,7 @@
           <a:p>
             <a:fld id="{118F4B29-713D-419B-9FB6-1A44B011F8E1}" type="datetimeFigureOut">
               <a:rPr lang="en-US" smtClean="0"/>
-              <a:t>1/24/2023</a:t>
+              <a:t>1/31/2023</a:t>
             </a:fld>
             <a:endParaRPr lang="en-US"/>
           </a:p>
@@ -987,7 +1073,7 @@
           <a:p>
             <a:fld id="{118F4B29-713D-419B-9FB6-1A44B011F8E1}" type="datetimeFigureOut">
               <a:rPr lang="en-US" smtClean="0"/>
-              <a:t>1/24/2023</a:t>
+              <a:t>1/31/2023</a:t>
             </a:fld>
             <a:endParaRPr lang="en-US"/>
           </a:p>
@@ -1155,7 +1241,7 @@
           <a:p>
             <a:fld id="{118F4B29-713D-419B-9FB6-1A44B011F8E1}" type="datetimeFigureOut">
               <a:rPr lang="en-US" smtClean="0"/>
-              <a:t>1/24/2023</a:t>
+              <a:t>1/31/2023</a:t>
             </a:fld>
             <a:endParaRPr lang="en-US"/>
           </a:p>
@@ -1430,7 +1516,7 @@
           <a:p>
             <a:fld id="{118F4B29-713D-419B-9FB6-1A44B011F8E1}" type="datetimeFigureOut">
               <a:rPr lang="en-US" smtClean="0"/>
-              <a:t>1/24/2023</a:t>
+              <a:t>1/31/2023</a:t>
             </a:fld>
             <a:endParaRPr lang="en-US"/>
           </a:p>
@@ -1689,7 +1775,7 @@
           <a:p>
             <a:fld id="{118F4B29-713D-419B-9FB6-1A44B011F8E1}" type="datetimeFigureOut">
               <a:rPr lang="en-US" smtClean="0"/>
-              <a:t>1/24/2023</a:t>
+              <a:t>1/31/2023</a:t>
             </a:fld>
             <a:endParaRPr lang="en-US"/>
           </a:p>
@@ -2083,7 +2169,7 @@
           <a:p>
             <a:fld id="{118F4B29-713D-419B-9FB6-1A44B011F8E1}" type="datetimeFigureOut">
               <a:rPr lang="en-US" smtClean="0"/>
-              <a:t>1/24/2023</a:t>
+              <a:t>1/31/2023</a:t>
             </a:fld>
             <a:endParaRPr lang="en-US"/>
           </a:p>
@@ -2200,7 +2286,7 @@
           <a:p>
             <a:fld id="{118F4B29-713D-419B-9FB6-1A44B011F8E1}" type="datetimeFigureOut">
               <a:rPr lang="en-US" smtClean="0"/>
-              <a:t>1/24/2023</a:t>
+              <a:t>1/31/2023</a:t>
             </a:fld>
             <a:endParaRPr lang="en-US"/>
           </a:p>
@@ -2295,7 +2381,7 @@
           <a:p>
             <a:fld id="{118F4B29-713D-419B-9FB6-1A44B011F8E1}" type="datetimeFigureOut">
               <a:rPr lang="en-US" smtClean="0"/>
-              <a:t>1/24/2023</a:t>
+              <a:t>1/31/2023</a:t>
             </a:fld>
             <a:endParaRPr lang="en-US"/>
           </a:p>
@@ -2570,7 +2656,7 @@
           <a:p>
             <a:fld id="{118F4B29-713D-419B-9FB6-1A44B011F8E1}" type="datetimeFigureOut">
               <a:rPr lang="en-US" smtClean="0"/>
-              <a:t>1/24/2023</a:t>
+              <a:t>1/31/2023</a:t>
             </a:fld>
             <a:endParaRPr lang="en-US"/>
           </a:p>
@@ -2822,7 +2908,7 @@
           <a:p>
             <a:fld id="{118F4B29-713D-419B-9FB6-1A44B011F8E1}" type="datetimeFigureOut">
               <a:rPr lang="en-US" smtClean="0"/>
-              <a:t>1/24/2023</a:t>
+              <a:t>1/31/2023</a:t>
             </a:fld>
             <a:endParaRPr lang="en-US"/>
           </a:p>
@@ -3033,7 +3119,7 @@
           <a:p>
             <a:fld id="{118F4B29-713D-419B-9FB6-1A44B011F8E1}" type="datetimeFigureOut">
               <a:rPr lang="en-US" smtClean="0"/>
-              <a:t>1/24/2023</a:t>
+              <a:t>1/31/2023</a:t>
             </a:fld>
             <a:endParaRPr lang="en-US"/>
           </a:p>
@@ -3671,38 +3757,6 @@
           </a:p>
         </p:txBody>
       </p:sp>
-      <p:pic>
-        <p:nvPicPr>
-          <p:cNvPr id="7" name="Content Placeholder 6">
-            <a:extLst>
-              <a:ext uri="{FF2B5EF4-FFF2-40B4-BE49-F238E27FC236}">
-                <a16:creationId xmlns:a16="http://schemas.microsoft.com/office/drawing/2014/main" id="{C9D8D897-7C05-4087-9787-D7E13E8EF5B8}"/>
-              </a:ext>
-            </a:extLst>
-          </p:cNvPr>
-          <p:cNvPicPr>
-            <a:picLocks noGrp="1" noChangeAspect="1"/>
-          </p:cNvPicPr>
-          <p:nvPr>
-            <p:ph idx="1"/>
-          </p:nvPr>
-        </p:nvPicPr>
-        <p:blipFill>
-          <a:blip r:embed="rId2"/>
-          <a:stretch>
-            <a:fillRect/>
-          </a:stretch>
-        </p:blipFill>
-        <p:spPr>
-          <a:xfrm>
-            <a:off x="4527804" y="787611"/>
-            <a:ext cx="5990467" cy="5568739"/>
-          </a:xfrm>
-          <a:prstGeom prst="rect">
-            <a:avLst/>
-          </a:prstGeom>
-        </p:spPr>
-      </p:pic>
       <p:sp>
         <p:nvSpPr>
           <p:cNvPr id="4" name="Slide Number Placeholder 3">
@@ -3761,6 +3815,36 @@
           </a:p>
         </p:txBody>
       </p:sp>
+      <p:pic>
+        <p:nvPicPr>
+          <p:cNvPr id="8" name="Picture 7">
+            <a:extLst>
+              <a:ext uri="{FF2B5EF4-FFF2-40B4-BE49-F238E27FC236}">
+                <a16:creationId xmlns:a16="http://schemas.microsoft.com/office/drawing/2014/main" id="{B9A1260B-A0D6-1DCA-7D5F-FE6434F98080}"/>
+              </a:ext>
+            </a:extLst>
+          </p:cNvPr>
+          <p:cNvPicPr>
+            <a:picLocks noChangeAspect="1"/>
+          </p:cNvPicPr>
+          <p:nvPr/>
+        </p:nvPicPr>
+        <p:blipFill>
+          <a:blip r:embed="rId2"/>
+          <a:stretch>
+            <a:fillRect/>
+          </a:stretch>
+        </p:blipFill>
+        <p:spPr>
+          <a:xfrm>
+            <a:off x="4267498" y="910704"/>
+            <a:ext cx="7924502" cy="5257962"/>
+          </a:xfrm>
+          <a:prstGeom prst="rect">
+            <a:avLst/>
+          </a:prstGeom>
+        </p:spPr>
+      </p:pic>
     </p:spTree>
     <p:extLst>
       <p:ext uri="{BB962C8B-B14F-4D97-AF65-F5344CB8AC3E}">
@@ -3967,6 +4051,89 @@
           </a:p>
         </p:txBody>
       </p:sp>
+      <p:pic>
+        <p:nvPicPr>
+          <p:cNvPr id="3" name="Picture 4" descr="Table&#10;&#10;Description automatically generated">
+            <a:extLst>
+              <a:ext uri="{FF2B5EF4-FFF2-40B4-BE49-F238E27FC236}">
+                <a16:creationId xmlns:a16="http://schemas.microsoft.com/office/drawing/2014/main" id="{21DF6606-EB55-0489-82C2-2EFD5E02C620}"/>
+              </a:ext>
+            </a:extLst>
+          </p:cNvPr>
+          <p:cNvPicPr>
+            <a:picLocks noChangeAspect="1"/>
+          </p:cNvPicPr>
+          <p:nvPr/>
+        </p:nvPicPr>
+        <p:blipFill>
+          <a:blip r:embed="rId2"/>
+          <a:stretch>
+            <a:fillRect/>
+          </a:stretch>
+        </p:blipFill>
+        <p:spPr>
+          <a:xfrm>
+            <a:off x="4415035" y="818537"/>
+            <a:ext cx="7536424" cy="5279214"/>
+          </a:xfrm>
+          <a:prstGeom prst="rect">
+            <a:avLst/>
+          </a:prstGeom>
+        </p:spPr>
+      </p:pic>
+      <p:sp>
+        <p:nvSpPr>
+          <p:cNvPr id="5" name="TextBox 4">
+            <a:extLst>
+              <a:ext uri="{FF2B5EF4-FFF2-40B4-BE49-F238E27FC236}">
+                <a16:creationId xmlns:a16="http://schemas.microsoft.com/office/drawing/2014/main" id="{30DFE64D-463E-1ED1-2D76-C72AB6A6A499}"/>
+              </a:ext>
+            </a:extLst>
+          </p:cNvPr>
+          <p:cNvSpPr txBox="1"/>
+          <p:nvPr/>
+        </p:nvSpPr>
+        <p:spPr>
+          <a:xfrm>
+            <a:off x="569064" y="4976884"/>
+            <a:ext cx="3857305" cy="1754326"/>
+          </a:xfrm>
+          <a:prstGeom prst="rect">
+            <a:avLst/>
+          </a:prstGeom>
+          <a:noFill/>
+        </p:spPr>
+        <p:txBody>
+          <a:bodyPr rot="0" spcFirstLastPara="0" vertOverflow="overflow" horzOverflow="overflow" vert="horz" wrap="square" lIns="91440" tIns="45720" rIns="91440" bIns="45720" numCol="1" spcCol="0" rtlCol="0" fromWordArt="0" anchor="t" anchorCtr="0" forceAA="0" compatLnSpc="1">
+            <a:prstTxWarp prst="textNoShape">
+              <a:avLst/>
+            </a:prstTxWarp>
+            <a:spAutoFit/>
+          </a:bodyPr>
+          <a:lstStyle/>
+          <a:p>
+            <a:r>
+              <a:rPr lang="en-US" dirty="0">
+                <a:cs typeface="Calibri"/>
+              </a:rPr>
+              <a:t>Notes: If user is not logged in, reserve button functions as a login button</a:t>
+            </a:r>
+          </a:p>
+          <a:p>
+            <a:endParaRPr lang="en-US" dirty="0">
+              <a:cs typeface="Calibri"/>
+            </a:endParaRPr>
+          </a:p>
+          <a:p>
+            <a:r>
+              <a:rPr lang="en-US" dirty="0">
+                <a:cs typeface="Calibri"/>
+              </a:rPr>
+              <a:t>If the user is already logged in, then the login button becomes a logout button</a:t>
+            </a:r>
+          </a:p>
+        </p:txBody>
+      </p:sp>
     </p:spTree>
     <p:extLst>
       <p:ext uri="{BB962C8B-B14F-4D97-AF65-F5344CB8AC3E}">
@@ -4173,6 +4340,106 @@
           </a:p>
         </p:txBody>
       </p:sp>
+      <p:pic>
+        <p:nvPicPr>
+          <p:cNvPr id="3" name="Picture 4" descr="Graphical user interface, text, application&#10;&#10;Description automatically generated">
+            <a:extLst>
+              <a:ext uri="{FF2B5EF4-FFF2-40B4-BE49-F238E27FC236}">
+                <a16:creationId xmlns:a16="http://schemas.microsoft.com/office/drawing/2014/main" id="{6C014000-91DD-481C-30BF-11F66624BB5E}"/>
+              </a:ext>
+            </a:extLst>
+          </p:cNvPr>
+          <p:cNvPicPr>
+            <a:picLocks noChangeAspect="1"/>
+          </p:cNvPicPr>
+          <p:nvPr/>
+        </p:nvPicPr>
+        <p:blipFill>
+          <a:blip r:embed="rId2"/>
+          <a:stretch>
+            <a:fillRect/>
+          </a:stretch>
+        </p:blipFill>
+        <p:spPr>
+          <a:xfrm>
+            <a:off x="4212431" y="1572036"/>
+            <a:ext cx="7267573" cy="3332927"/>
+          </a:xfrm>
+          <a:prstGeom prst="rect">
+            <a:avLst/>
+          </a:prstGeom>
+        </p:spPr>
+      </p:pic>
+      <p:sp>
+        <p:nvSpPr>
+          <p:cNvPr id="5" name="TextBox 4">
+            <a:extLst>
+              <a:ext uri="{FF2B5EF4-FFF2-40B4-BE49-F238E27FC236}">
+                <a16:creationId xmlns:a16="http://schemas.microsoft.com/office/drawing/2014/main" id="{8255A0B0-3690-3373-E553-99D9468791AB}"/>
+              </a:ext>
+            </a:extLst>
+          </p:cNvPr>
+          <p:cNvSpPr txBox="1"/>
+          <p:nvPr/>
+        </p:nvSpPr>
+        <p:spPr>
+          <a:xfrm>
+            <a:off x="7514253" y="2397967"/>
+            <a:ext cx="1517780" cy="400110"/>
+          </a:xfrm>
+          <a:prstGeom prst="rect">
+            <a:avLst/>
+          </a:prstGeom>
+          <a:noFill/>
+        </p:spPr>
+        <p:txBody>
+          <a:bodyPr wrap="square" rtlCol="0">
+            <a:spAutoFit/>
+          </a:bodyPr>
+          <a:lstStyle/>
+          <a:p>
+            <a:r>
+              <a:rPr lang="en-US" sz="2000" dirty="0"/>
+              <a:t>John Smith</a:t>
+            </a:r>
+          </a:p>
+        </p:txBody>
+      </p:sp>
+      <p:sp>
+        <p:nvSpPr>
+          <p:cNvPr id="6" name="TextBox 5">
+            <a:extLst>
+              <a:ext uri="{FF2B5EF4-FFF2-40B4-BE49-F238E27FC236}">
+                <a16:creationId xmlns:a16="http://schemas.microsoft.com/office/drawing/2014/main" id="{5FE5186D-5428-2D22-F154-5ABD4ADCCEFB}"/>
+              </a:ext>
+            </a:extLst>
+          </p:cNvPr>
+          <p:cNvSpPr txBox="1"/>
+          <p:nvPr/>
+        </p:nvSpPr>
+        <p:spPr>
+          <a:xfrm>
+            <a:off x="7514253" y="3539412"/>
+            <a:ext cx="1517780" cy="400110"/>
+          </a:xfrm>
+          <a:prstGeom prst="rect">
+            <a:avLst/>
+          </a:prstGeom>
+          <a:noFill/>
+        </p:spPr>
+        <p:txBody>
+          <a:bodyPr wrap="square" rtlCol="0">
+            <a:spAutoFit/>
+          </a:bodyPr>
+          <a:lstStyle/>
+          <a:p>
+            <a:r>
+              <a:rPr lang="en-US" sz="2000" dirty="0"/>
+              <a:t>**********</a:t>
+            </a:r>
+          </a:p>
+        </p:txBody>
+      </p:sp>
     </p:spTree>
     <p:extLst>
       <p:ext uri="{BB962C8B-B14F-4D97-AF65-F5344CB8AC3E}">
@@ -4384,6 +4651,36 @@
           </a:p>
         </p:txBody>
       </p:sp>
+      <p:pic>
+        <p:nvPicPr>
+          <p:cNvPr id="3" name="Picture 4" descr="Graphical user interface, text, application&#10;&#10;Description automatically generated">
+            <a:extLst>
+              <a:ext uri="{FF2B5EF4-FFF2-40B4-BE49-F238E27FC236}">
+                <a16:creationId xmlns:a16="http://schemas.microsoft.com/office/drawing/2014/main" id="{E680DA0B-A722-E472-ADDA-B67736179FBE}"/>
+              </a:ext>
+            </a:extLst>
+          </p:cNvPr>
+          <p:cNvPicPr>
+            <a:picLocks noChangeAspect="1"/>
+          </p:cNvPicPr>
+          <p:nvPr/>
+        </p:nvPicPr>
+        <p:blipFill>
+          <a:blip r:embed="rId2"/>
+          <a:stretch>
+            <a:fillRect/>
+          </a:stretch>
+        </p:blipFill>
+        <p:spPr>
+          <a:xfrm>
+            <a:off x="4429432" y="1581637"/>
+            <a:ext cx="7229167" cy="3338305"/>
+          </a:xfrm>
+          <a:prstGeom prst="rect">
+            <a:avLst/>
+          </a:prstGeom>
+        </p:spPr>
+      </p:pic>
     </p:spTree>
     <p:extLst>
       <p:ext uri="{BB962C8B-B14F-4D97-AF65-F5344CB8AC3E}">
@@ -4595,6 +4892,76 @@
           </a:p>
         </p:txBody>
       </p:sp>
+      <p:pic>
+        <p:nvPicPr>
+          <p:cNvPr id="5" name="Picture 5" descr="Letter&#10;&#10;Description automatically generated">
+            <a:extLst>
+              <a:ext uri="{FF2B5EF4-FFF2-40B4-BE49-F238E27FC236}">
+                <a16:creationId xmlns:a16="http://schemas.microsoft.com/office/drawing/2014/main" id="{025FCAA5-B60D-1EEF-B674-26CDFB1793FD}"/>
+              </a:ext>
+            </a:extLst>
+          </p:cNvPr>
+          <p:cNvPicPr>
+            <a:picLocks noChangeAspect="1"/>
+          </p:cNvPicPr>
+          <p:nvPr/>
+        </p:nvPicPr>
+        <p:blipFill>
+          <a:blip r:embed="rId2"/>
+          <a:stretch>
+            <a:fillRect/>
+          </a:stretch>
+        </p:blipFill>
+        <p:spPr>
+          <a:xfrm>
+            <a:off x="4452258" y="1215046"/>
+            <a:ext cx="7315199" cy="4362590"/>
+          </a:xfrm>
+          <a:prstGeom prst="rect">
+            <a:avLst/>
+          </a:prstGeom>
+        </p:spPr>
+      </p:pic>
+      <p:sp>
+        <p:nvSpPr>
+          <p:cNvPr id="6" name="TextBox 5">
+            <a:extLst>
+              <a:ext uri="{FF2B5EF4-FFF2-40B4-BE49-F238E27FC236}">
+                <a16:creationId xmlns:a16="http://schemas.microsoft.com/office/drawing/2014/main" id="{C54B83EF-4149-F4DD-E507-DBCEA91436A4}"/>
+              </a:ext>
+            </a:extLst>
+          </p:cNvPr>
+          <p:cNvSpPr txBox="1"/>
+          <p:nvPr/>
+        </p:nvSpPr>
+        <p:spPr>
+          <a:xfrm>
+            <a:off x="936171" y="5421085"/>
+            <a:ext cx="2710542" cy="646331"/>
+          </a:xfrm>
+          <a:prstGeom prst="rect">
+            <a:avLst/>
+          </a:prstGeom>
+          <a:noFill/>
+        </p:spPr>
+        <p:txBody>
+          <a:bodyPr rot="0" spcFirstLastPara="0" vertOverflow="overflow" horzOverflow="overflow" vert="horz" wrap="square" lIns="91440" tIns="45720" rIns="91440" bIns="45720" numCol="1" spcCol="0" rtlCol="0" fromWordArt="0" anchor="t" anchorCtr="0" forceAA="0" compatLnSpc="1">
+            <a:prstTxWarp prst="textNoShape">
+              <a:avLst/>
+            </a:prstTxWarp>
+            <a:spAutoFit/>
+          </a:bodyPr>
+          <a:lstStyle/>
+          <a:p>
+            <a:r>
+              <a:rPr lang="en-US" dirty="0">
+                <a:cs typeface="Calibri"/>
+              </a:rPr>
+              <a:t>User must be logged in as Guest to view this page.</a:t>
+            </a:r>
+          </a:p>
+        </p:txBody>
+      </p:sp>
     </p:spTree>
     <p:extLst>
       <p:ext uri="{BB962C8B-B14F-4D97-AF65-F5344CB8AC3E}">
@@ -4806,6 +5173,77 @@
           </a:p>
         </p:txBody>
       </p:sp>
+      <p:pic>
+        <p:nvPicPr>
+          <p:cNvPr id="6" name="Picture 6" descr="Letter&#10;&#10;Description automatically generated">
+            <a:extLst>
+              <a:ext uri="{FF2B5EF4-FFF2-40B4-BE49-F238E27FC236}">
+                <a16:creationId xmlns:a16="http://schemas.microsoft.com/office/drawing/2014/main" id="{FF8B6B01-0B04-18A7-F078-4566EA9A5504}"/>
+              </a:ext>
+            </a:extLst>
+          </p:cNvPr>
+          <p:cNvPicPr>
+            <a:picLocks noChangeAspect="1"/>
+          </p:cNvPicPr>
+          <p:nvPr/>
+        </p:nvPicPr>
+        <p:blipFill>
+          <a:blip r:embed="rId2"/>
+          <a:stretch>
+            <a:fillRect/>
+          </a:stretch>
+        </p:blipFill>
+        <p:spPr>
+          <a:xfrm>
+            <a:off x="4354286" y="1149732"/>
+            <a:ext cx="7434942" cy="4438791"/>
+          </a:xfrm>
+          <a:prstGeom prst="rect">
+            <a:avLst/>
+          </a:prstGeom>
+        </p:spPr>
+      </p:pic>
+      <p:sp>
+        <p:nvSpPr>
+          <p:cNvPr id="7" name="TextBox 6">
+            <a:extLst>
+              <a:ext uri="{FF2B5EF4-FFF2-40B4-BE49-F238E27FC236}">
+                <a16:creationId xmlns:a16="http://schemas.microsoft.com/office/drawing/2014/main" id="{27D93380-6521-92A3-2CFE-DE8812C417DA}"/>
+              </a:ext>
+            </a:extLst>
+          </p:cNvPr>
+          <p:cNvSpPr txBox="1"/>
+          <p:nvPr/>
+        </p:nvSpPr>
+        <p:spPr>
+          <a:xfrm>
+            <a:off x="816428" y="5366657"/>
+            <a:ext cx="2950028" cy="646331"/>
+          </a:xfrm>
+          <a:prstGeom prst="rect">
+            <a:avLst/>
+          </a:prstGeom>
+          <a:noFill/>
+        </p:spPr>
+        <p:txBody>
+          <a:bodyPr rot="0" spcFirstLastPara="0" vertOverflow="overflow" horzOverflow="overflow" vert="horz" wrap="square" lIns="91440" tIns="45720" rIns="91440" bIns="45720" numCol="1" spcCol="0" rtlCol="0" fromWordArt="0" anchor="t" anchorCtr="0" forceAA="0" compatLnSpc="1">
+            <a:prstTxWarp prst="textNoShape">
+              <a:avLst/>
+            </a:prstTxWarp>
+            <a:spAutoFit/>
+          </a:bodyPr>
+          <a:lstStyle/>
+          <a:p>
+            <a:r>
+              <a:rPr lang="en-US" dirty="0">
+                <a:cs typeface="Calibri"/>
+              </a:rPr>
+              <a:t>User must be logged in as Admin to view this page.</a:t>
+            </a:r>
+            <a:endParaRPr lang="en-US" dirty="0"/>
+          </a:p>
+        </p:txBody>
+      </p:sp>
     </p:spTree>
     <p:extLst>
       <p:ext uri="{BB962C8B-B14F-4D97-AF65-F5344CB8AC3E}">
@@ -4892,19 +5330,19 @@
           <a:p>
             <a:r>
               <a:rPr lang="en-US" dirty="0"/>
-              <a:t>Effective Solution for a Room Management system</a:t>
+              <a:t>Light-weight and effective solution for a Room Management System</a:t>
             </a:r>
           </a:p>
           <a:p>
             <a:r>
               <a:rPr lang="en-US" dirty="0"/>
-              <a:t>Compact UI design enables a simple yet effective user experience, while not compromising security.</a:t>
+              <a:t>Compact UI design enables a simple and concise user experience, without compromising security.</a:t>
             </a:r>
           </a:p>
           <a:p>
             <a:r>
               <a:rPr lang="en-US" dirty="0"/>
-              <a:t>Rendering of all rooms at startup allows for users to start reserving rooms immediately. Minimal wait time makes for maximum user experience.</a:t>
+              <a:t>Pre-fetching of all rooms at startup allows for registered users to start reserving rooms immediately. </a:t>
             </a:r>
           </a:p>
           <a:p>
@@ -4915,10 +5353,9 @@
           </a:p>
           <a:p>
             <a:r>
-              <a:rPr lang="en-US"/>
-              <a:t>????</a:t>
-            </a:r>
-            <a:endParaRPr lang="en-US" dirty="0"/>
+              <a:rPr lang="en-US" dirty="0"/>
+              <a:t>Perfect for small to moderate sized buildings.</a:t>
+            </a:r>
           </a:p>
         </p:txBody>
       </p:sp>
@@ -5487,12 +5924,194 @@
 </file>
 
 <file path=customXml/item1.xml><?xml version="1.0" encoding="utf-8"?>
+<?mso-contentType ?>
+<FormTemplates xmlns="http://schemas.microsoft.com/sharepoint/v3/contenttype/forms">
+  <Display>DocumentLibraryForm</Display>
+  <Edit>DocumentLibraryForm</Edit>
+  <New>DocumentLibraryForm</New>
+</FormTemplates>
+</file>
+
+<file path=customXml/item2.xml><?xml version="1.0" encoding="utf-8"?>
+<ct:contentTypeSchema xmlns:ct="http://schemas.microsoft.com/office/2006/metadata/contentType" xmlns:ma="http://schemas.microsoft.com/office/2006/metadata/properties/metaAttributes" ct:_="" ma:_="" ma:contentTypeName="Document" ma:contentTypeID="0x0101000DE39319FFEFCD4988E17C78942B81AD" ma:contentTypeVersion="2" ma:contentTypeDescription="Create a new document." ma:contentTypeScope="" ma:versionID="3c1b2b70e159e4373485f92c41e03b1c">
+  <xsd:schema xmlns:xsd="http://www.w3.org/2001/XMLSchema" xmlns:xs="http://www.w3.org/2001/XMLSchema" xmlns:p="http://schemas.microsoft.com/office/2006/metadata/properties" xmlns:ns2="6cb18d2c-5cd7-471e-b96a-7fb3ace485e7" targetNamespace="http://schemas.microsoft.com/office/2006/metadata/properties" ma:root="true" ma:fieldsID="a5e4c65cb2e21ac71318246f8511c2ad" ns2:_="">
+    <xsd:import namespace="6cb18d2c-5cd7-471e-b96a-7fb3ace485e7"/>
+    <xsd:element name="properties">
+      <xsd:complexType>
+        <xsd:sequence>
+          <xsd:element name="documentManagement">
+            <xsd:complexType>
+              <xsd:all>
+                <xsd:element ref="ns2:MediaServiceMetadata" minOccurs="0"/>
+                <xsd:element ref="ns2:MediaServiceFastMetadata" minOccurs="0"/>
+              </xsd:all>
+            </xsd:complexType>
+          </xsd:element>
+        </xsd:sequence>
+      </xsd:complexType>
+    </xsd:element>
+  </xsd:schema>
+  <xsd:schema xmlns:xsd="http://www.w3.org/2001/XMLSchema" xmlns:xs="http://www.w3.org/2001/XMLSchema" xmlns:dms="http://schemas.microsoft.com/office/2006/documentManagement/types" xmlns:pc="http://schemas.microsoft.com/office/infopath/2007/PartnerControls" targetNamespace="6cb18d2c-5cd7-471e-b96a-7fb3ace485e7" elementFormDefault="qualified">
+    <xsd:import namespace="http://schemas.microsoft.com/office/2006/documentManagement/types"/>
+    <xsd:import namespace="http://schemas.microsoft.com/office/infopath/2007/PartnerControls"/>
+    <xsd:element name="MediaServiceMetadata" ma:index="8" nillable="true" ma:displayName="MediaServiceMetadata" ma:hidden="true" ma:internalName="MediaServiceMetadata" ma:readOnly="true">
+      <xsd:simpleType>
+        <xsd:restriction base="dms:Note"/>
+      </xsd:simpleType>
+    </xsd:element>
+    <xsd:element name="MediaServiceFastMetadata" ma:index="9" nillable="true" ma:displayName="MediaServiceFastMetadata" ma:hidden="true" ma:internalName="MediaServiceFastMetadata" ma:readOnly="true">
+      <xsd:simpleType>
+        <xsd:restriction base="dms:Note"/>
+      </xsd:simpleType>
+    </xsd:element>
+  </xsd:schema>
+  <xsd:schema xmlns="http://schemas.openxmlformats.org/package/2006/metadata/core-properties" xmlns:xsd="http://www.w3.org/2001/XMLSchema" xmlns:xsi="http://www.w3.org/2001/XMLSchema-instance" xmlns:dc="http://purl.org/dc/elements/1.1/" xmlns:dcterms="http://purl.org/dc/terms/" xmlns:odoc="http://schemas.microsoft.com/internal/obd" targetNamespace="http://schemas.openxmlformats.org/package/2006/metadata/core-properties" elementFormDefault="qualified" attributeFormDefault="unqualified" blockDefault="#all">
+    <xsd:import namespace="http://purl.org/dc/elements/1.1/" schemaLocation="http://dublincore.org/schemas/xmls/qdc/2003/04/02/dc.xsd"/>
+    <xsd:import namespace="http://purl.org/dc/terms/" schemaLocation="http://dublincore.org/schemas/xmls/qdc/2003/04/02/dcterms.xsd"/>
+    <xsd:element name="coreProperties" type="CT_coreProperties"/>
+    <xsd:complexType name="CT_coreProperties">
+      <xsd:all>
+        <xsd:element ref="dc:creator" minOccurs="0" maxOccurs="1"/>
+        <xsd:element ref="dcterms:created" minOccurs="0" maxOccurs="1"/>
+        <xsd:element ref="dc:identifier" minOccurs="0" maxOccurs="1"/>
+        <xsd:element name="contentType" minOccurs="0" maxOccurs="1" type="xsd:string" ma:index="0" ma:displayName="Content Type"/>
+        <xsd:element ref="dc:title" minOccurs="0" maxOccurs="1" ma:index="4" ma:displayName="Title"/>
+        <xsd:element ref="dc:subject" minOccurs="0" maxOccurs="1"/>
+        <xsd:element ref="dc:description" minOccurs="0" maxOccurs="1"/>
+        <xsd:element name="keywords" minOccurs="0" maxOccurs="1" type="xsd:string"/>
+        <xsd:element ref="dc:language" minOccurs="0" maxOccurs="1"/>
+        <xsd:element name="category" minOccurs="0" maxOccurs="1" type="xsd:string"/>
+        <xsd:element name="version" minOccurs="0" maxOccurs="1" type="xsd:string"/>
+        <xsd:element name="revision" minOccurs="0" maxOccurs="1" type="xsd:string">
+          <xsd:annotation>
+            <xsd:documentation>
+                        This value indicates the number of saves or revisions. The application is responsible for updating this value after each revision.
+                    </xsd:documentation>
+          </xsd:annotation>
+        </xsd:element>
+        <xsd:element name="lastModifiedBy" minOccurs="0" maxOccurs="1" type="xsd:string"/>
+        <xsd:element ref="dcterms:modified" minOccurs="0" maxOccurs="1"/>
+        <xsd:element name="contentStatus" minOccurs="0" maxOccurs="1" type="xsd:string"/>
+      </xsd:all>
+    </xsd:complexType>
+  </xsd:schema>
+  <xs:schema xmlns:pc="http://schemas.microsoft.com/office/infopath/2007/PartnerControls" xmlns:xs="http://www.w3.org/2001/XMLSchema" targetNamespace="http://schemas.microsoft.com/office/infopath/2007/PartnerControls" elementFormDefault="qualified" attributeFormDefault="unqualified">
+    <xs:element name="Person">
+      <xs:complexType>
+        <xs:sequence>
+          <xs:element ref="pc:DisplayName" minOccurs="0"/>
+          <xs:element ref="pc:AccountId" minOccurs="0"/>
+          <xs:element ref="pc:AccountType" minOccurs="0"/>
+        </xs:sequence>
+      </xs:complexType>
+    </xs:element>
+    <xs:element name="DisplayName" type="xs:string"/>
+    <xs:element name="AccountId" type="xs:string"/>
+    <xs:element name="AccountType" type="xs:string"/>
+    <xs:element name="BDCAssociatedEntity">
+      <xs:complexType>
+        <xs:sequence>
+          <xs:element ref="pc:BDCEntity" minOccurs="0" maxOccurs="unbounded"/>
+        </xs:sequence>
+        <xs:attribute ref="pc:EntityNamespace"/>
+        <xs:attribute ref="pc:EntityName"/>
+        <xs:attribute ref="pc:SystemInstanceName"/>
+        <xs:attribute ref="pc:AssociationName"/>
+      </xs:complexType>
+    </xs:element>
+    <xs:attribute name="EntityNamespace" type="xs:string"/>
+    <xs:attribute name="EntityName" type="xs:string"/>
+    <xs:attribute name="SystemInstanceName" type="xs:string"/>
+    <xs:attribute name="AssociationName" type="xs:string"/>
+    <xs:element name="BDCEntity">
+      <xs:complexType>
+        <xs:sequence>
+          <xs:element ref="pc:EntityDisplayName" minOccurs="0"/>
+          <xs:element ref="pc:EntityInstanceReference" minOccurs="0"/>
+          <xs:element ref="pc:EntityId1" minOccurs="0"/>
+          <xs:element ref="pc:EntityId2" minOccurs="0"/>
+          <xs:element ref="pc:EntityId3" minOccurs="0"/>
+          <xs:element ref="pc:EntityId4" minOccurs="0"/>
+          <xs:element ref="pc:EntityId5" minOccurs="0"/>
+        </xs:sequence>
+      </xs:complexType>
+    </xs:element>
+    <xs:element name="EntityDisplayName" type="xs:string"/>
+    <xs:element name="EntityInstanceReference" type="xs:string"/>
+    <xs:element name="EntityId1" type="xs:string"/>
+    <xs:element name="EntityId2" type="xs:string"/>
+    <xs:element name="EntityId3" type="xs:string"/>
+    <xs:element name="EntityId4" type="xs:string"/>
+    <xs:element name="EntityId5" type="xs:string"/>
+    <xs:element name="Terms">
+      <xs:complexType>
+        <xs:sequence>
+          <xs:element ref="pc:TermInfo" minOccurs="0" maxOccurs="unbounded"/>
+        </xs:sequence>
+      </xs:complexType>
+    </xs:element>
+    <xs:element name="TermInfo">
+      <xs:complexType>
+        <xs:sequence>
+          <xs:element ref="pc:TermName" minOccurs="0"/>
+          <xs:element ref="pc:TermId" minOccurs="0"/>
+        </xs:sequence>
+      </xs:complexType>
+    </xs:element>
+    <xs:element name="TermName" type="xs:string"/>
+    <xs:element name="TermId" type="xs:string"/>
+  </xs:schema>
+</ct:contentTypeSchema>
+</file>
+
+<file path=customXml/item3.xml><?xml version="1.0" encoding="utf-8"?>
+<p:properties xmlns:p="http://schemas.microsoft.com/office/2006/metadata/properties" xmlns:xsi="http://www.w3.org/2001/XMLSchema-instance" xmlns:pc="http://schemas.microsoft.com/office/infopath/2007/PartnerControls">
+  <documentManagement/>
+</p:properties>
+</file>
+
+<file path=customXml/item4.xml><?xml version="1.0" encoding="utf-8"?>
 <Control xmlns="http://schemas.microsoft.com/VisualStudio/2011/storyboarding/control">
   <Id Name="1822cccb-7a0d-4c2c-8198-2546f04b85e6" Revision="1" Stencil="System.MyShapes" StencilVersion="1.0"/>
 </Control>
 </file>
 
 <file path=customXml/itemProps1.xml><?xml version="1.0" encoding="utf-8"?>
+<ds:datastoreItem xmlns:ds="http://schemas.openxmlformats.org/officeDocument/2006/customXml" ds:itemID="{8B8ADF60-9D29-4BED-99E2-C997DF5191E3}">
+  <ds:schemaRefs>
+    <ds:schemaRef ds:uri="http://schemas.microsoft.com/sharepoint/v3/contenttype/forms"/>
+  </ds:schemaRefs>
+</ds:datastoreItem>
+</file>
+
+<file path=customXml/itemProps2.xml><?xml version="1.0" encoding="utf-8"?>
+<ds:datastoreItem xmlns:ds="http://schemas.openxmlformats.org/officeDocument/2006/customXml" ds:itemID="{C50D3AAB-AA88-4B36-827E-9D1BC019CBCD}">
+  <ds:schemaRefs>
+    <ds:schemaRef ds:uri="http://schemas.microsoft.com/office/2006/metadata/contentType"/>
+    <ds:schemaRef ds:uri="http://schemas.microsoft.com/office/2006/metadata/properties/metaAttributes"/>
+    <ds:schemaRef ds:uri="http://www.w3.org/2001/XMLSchema"/>
+    <ds:schemaRef ds:uri="http://schemas.microsoft.com/office/2006/metadata/properties"/>
+    <ds:schemaRef ds:uri="6cb18d2c-5cd7-471e-b96a-7fb3ace485e7"/>
+    <ds:schemaRef ds:uri="http://schemas.microsoft.com/office/2006/documentManagement/types"/>
+    <ds:schemaRef ds:uri="http://schemas.microsoft.com/office/infopath/2007/PartnerControls"/>
+    <ds:schemaRef ds:uri="http://schemas.openxmlformats.org/package/2006/metadata/core-properties"/>
+    <ds:schemaRef ds:uri="http://purl.org/dc/elements/1.1/"/>
+    <ds:schemaRef ds:uri="http://purl.org/dc/terms/"/>
+    <ds:schemaRef ds:uri="http://schemas.microsoft.com/internal/obd"/>
+  </ds:schemaRefs>
+</ds:datastoreItem>
+</file>
+
+<file path=customXml/itemProps3.xml><?xml version="1.0" encoding="utf-8"?>
+<ds:datastoreItem xmlns:ds="http://schemas.openxmlformats.org/officeDocument/2006/customXml" ds:itemID="{36E38B98-2217-4A31-BAB5-FC31EFE32440}">
+  <ds:schemaRefs>
+    <ds:schemaRef ds:uri="http://schemas.microsoft.com/office/2006/metadata/properties"/>
+    <ds:schemaRef ds:uri="http://schemas.microsoft.com/office/infopath/2007/PartnerControls"/>
+  </ds:schemaRefs>
+</ds:datastoreItem>
+</file>
+
+<file path=customXml/itemProps4.xml><?xml version="1.0" encoding="utf-8"?>
 <ds:datastoreItem xmlns:ds="http://schemas.openxmlformats.org/officeDocument/2006/customXml" ds:itemID="{1C0CF7AA-025C-4AF4-B4D5-5B8C1839054C}">
   <ds:schemaRefs>
     <ds:schemaRef ds:uri="http://schemas.microsoft.com/VisualStudio/2011/storyboarding/control"/>

</xml_diff>